<commit_message>
Update: Form Recognizer name
</commit_message>
<xml_diff>
--- a/docs/images/fig.pptx
+++ b/docs/images/fig.pptx
@@ -205,7 +205,7 @@
           <a:p>
             <a:fld id="{6343158B-3BB4-4E56-9236-2FCD7DBA1E21}" type="datetimeFigureOut">
               <a:rPr kumimoji="1" lang="ja-JP" altLang="en-US" smtClean="0"/>
-              <a:t>2023/5/22</a:t>
+              <a:t>2023/5/23</a:t>
             </a:fld>
             <a:endParaRPr kumimoji="1" lang="ja-JP" altLang="en-US"/>
           </a:p>
@@ -823,7 +823,7 @@
           <a:p>
             <a:fld id="{24D7686E-F428-4795-A070-8AB1B0A30AE4}" type="datetimeFigureOut">
               <a:rPr kumimoji="1" lang="ja-JP" altLang="en-US" smtClean="0"/>
-              <a:t>2023/5/22</a:t>
+              <a:t>2023/5/23</a:t>
             </a:fld>
             <a:endParaRPr kumimoji="1" lang="ja-JP" altLang="en-US"/>
           </a:p>
@@ -1053,7 +1053,7 @@
           <a:p>
             <a:fld id="{24D7686E-F428-4795-A070-8AB1B0A30AE4}" type="datetimeFigureOut">
               <a:rPr kumimoji="1" lang="ja-JP" altLang="en-US" smtClean="0"/>
-              <a:t>2023/5/22</a:t>
+              <a:t>2023/5/23</a:t>
             </a:fld>
             <a:endParaRPr kumimoji="1" lang="ja-JP" altLang="en-US"/>
           </a:p>
@@ -1293,7 +1293,7 @@
           <a:p>
             <a:fld id="{24D7686E-F428-4795-A070-8AB1B0A30AE4}" type="datetimeFigureOut">
               <a:rPr kumimoji="1" lang="ja-JP" altLang="en-US" smtClean="0"/>
-              <a:t>2023/5/22</a:t>
+              <a:t>2023/5/23</a:t>
             </a:fld>
             <a:endParaRPr kumimoji="1" lang="ja-JP" altLang="en-US"/>
           </a:p>
@@ -2086,7 +2086,7 @@
           <a:p>
             <a:fld id="{24D7686E-F428-4795-A070-8AB1B0A30AE4}" type="datetimeFigureOut">
               <a:rPr kumimoji="1" lang="ja-JP" altLang="en-US" smtClean="0"/>
-              <a:t>2023/5/22</a:t>
+              <a:t>2023/5/23</a:t>
             </a:fld>
             <a:endParaRPr kumimoji="1" lang="ja-JP" altLang="en-US"/>
           </a:p>
@@ -2361,7 +2361,7 @@
           <a:p>
             <a:fld id="{24D7686E-F428-4795-A070-8AB1B0A30AE4}" type="datetimeFigureOut">
               <a:rPr kumimoji="1" lang="ja-JP" altLang="en-US" smtClean="0"/>
-              <a:t>2023/5/22</a:t>
+              <a:t>2023/5/23</a:t>
             </a:fld>
             <a:endParaRPr kumimoji="1" lang="ja-JP" altLang="en-US"/>
           </a:p>
@@ -2690,7 +2690,7 @@
           <a:p>
             <a:fld id="{24D7686E-F428-4795-A070-8AB1B0A30AE4}" type="datetimeFigureOut">
               <a:rPr kumimoji="1" lang="ja-JP" altLang="en-US" smtClean="0"/>
-              <a:t>2023/5/22</a:t>
+              <a:t>2023/5/23</a:t>
             </a:fld>
             <a:endParaRPr kumimoji="1" lang="ja-JP" altLang="en-US"/>
           </a:p>
@@ -3166,7 +3166,7 @@
           <a:p>
             <a:fld id="{24D7686E-F428-4795-A070-8AB1B0A30AE4}" type="datetimeFigureOut">
               <a:rPr kumimoji="1" lang="ja-JP" altLang="en-US" smtClean="0"/>
-              <a:t>2023/5/22</a:t>
+              <a:t>2023/5/23</a:t>
             </a:fld>
             <a:endParaRPr kumimoji="1" lang="ja-JP" altLang="en-US"/>
           </a:p>
@@ -3307,7 +3307,7 @@
           <a:p>
             <a:fld id="{24D7686E-F428-4795-A070-8AB1B0A30AE4}" type="datetimeFigureOut">
               <a:rPr kumimoji="1" lang="ja-JP" altLang="en-US" smtClean="0"/>
-              <a:t>2023/5/22</a:t>
+              <a:t>2023/5/23</a:t>
             </a:fld>
             <a:endParaRPr kumimoji="1" lang="ja-JP" altLang="en-US"/>
           </a:p>
@@ -3420,7 +3420,7 @@
           <a:p>
             <a:fld id="{24D7686E-F428-4795-A070-8AB1B0A30AE4}" type="datetimeFigureOut">
               <a:rPr kumimoji="1" lang="ja-JP" altLang="en-US" smtClean="0"/>
-              <a:t>2023/5/22</a:t>
+              <a:t>2023/5/23</a:t>
             </a:fld>
             <a:endParaRPr kumimoji="1" lang="ja-JP" altLang="en-US"/>
           </a:p>
@@ -3763,7 +3763,7 @@
           <a:p>
             <a:fld id="{24D7686E-F428-4795-A070-8AB1B0A30AE4}" type="datetimeFigureOut">
               <a:rPr kumimoji="1" lang="ja-JP" altLang="en-US" smtClean="0"/>
-              <a:t>2023/5/22</a:t>
+              <a:t>2023/5/23</a:t>
             </a:fld>
             <a:endParaRPr kumimoji="1" lang="ja-JP" altLang="en-US"/>
           </a:p>
@@ -4051,7 +4051,7 @@
           <a:p>
             <a:fld id="{24D7686E-F428-4795-A070-8AB1B0A30AE4}" type="datetimeFigureOut">
               <a:rPr kumimoji="1" lang="ja-JP" altLang="en-US" smtClean="0"/>
-              <a:t>2023/5/22</a:t>
+              <a:t>2023/5/23</a:t>
             </a:fld>
             <a:endParaRPr kumimoji="1" lang="ja-JP" altLang="en-US"/>
           </a:p>
@@ -4324,7 +4324,7 @@
           <a:p>
             <a:fld id="{24D7686E-F428-4795-A070-8AB1B0A30AE4}" type="datetimeFigureOut">
               <a:rPr kumimoji="1" lang="ja-JP" altLang="en-US" smtClean="0"/>
-              <a:t>2023/5/22</a:t>
+              <a:t>2023/5/23</a:t>
             </a:fld>
             <a:endParaRPr kumimoji="1" lang="ja-JP" altLang="en-US"/>
           </a:p>
@@ -7811,12 +7811,554 @@
           </a:fontRef>
         </p:style>
       </p:cxnSp>
+      <p:sp>
+        <p:nvSpPr>
+          <p:cNvPr id="1045" name="テキスト ボックス 1044">
+            <a:extLst>
+              <a:ext uri="{FF2B5EF4-FFF2-40B4-BE49-F238E27FC236}">
+                <a16:creationId xmlns:a16="http://schemas.microsoft.com/office/drawing/2014/main" id="{8488F53D-8FBD-D11B-495D-AB20C28F8F62}"/>
+              </a:ext>
+            </a:extLst>
+          </p:cNvPr>
+          <p:cNvSpPr txBox="1"/>
+          <p:nvPr/>
+        </p:nvSpPr>
+        <p:spPr>
+          <a:xfrm>
+            <a:off x="7997142" y="4564583"/>
+            <a:ext cx="887454" cy="276999"/>
+          </a:xfrm>
+          <a:prstGeom prst="rect">
+            <a:avLst/>
+          </a:prstGeom>
+          <a:noFill/>
+        </p:spPr>
+        <p:txBody>
+          <a:bodyPr wrap="square">
+            <a:spAutoFit/>
+          </a:bodyPr>
+          <a:lstStyle/>
+          <a:p>
+            <a:pPr marL="0" marR="0" lvl="0" indent="0" algn="l" defTabSz="914367" rtl="0" eaLnBrk="1" fontAlgn="auto" latinLnBrk="0" hangingPunct="1">
+              <a:lnSpc>
+                <a:spcPct val="100000"/>
+              </a:lnSpc>
+              <a:spcBef>
+                <a:spcPts val="0"/>
+              </a:spcBef>
+              <a:spcAft>
+                <a:spcPts val="0"/>
+              </a:spcAft>
+              <a:buClrTx/>
+              <a:buSzTx/>
+              <a:buFontTx/>
+              <a:buNone/>
+              <a:tabLst/>
+              <a:defRPr/>
+            </a:pPr>
+            <a:r>
+              <a:rPr kumimoji="1" lang="en-US" altLang="ja-JP" sz="1200" b="0" i="0" u="none" strike="noStrike" kern="1200" cap="none" spc="0" normalizeH="0" baseline="0" noProof="0" dirty="0">
+                <a:ln>
+                  <a:noFill/>
+                </a:ln>
+                <a:solidFill>
+                  <a:schemeClr val="accent1"/>
+                </a:solidFill>
+                <a:effectLst/>
+                <a:uLnTx/>
+                <a:uFillTx/>
+                <a:latin typeface="Yu Gothic UI Semibold" panose="020B0700000000000000" pitchFamily="50" charset="-128"/>
+                <a:ea typeface="Yu Gothic UI Semibold" panose="020B0700000000000000" pitchFamily="50" charset="-128"/>
+                <a:cs typeface="+mn-cs"/>
+              </a:rPr>
+              <a:t>GPT</a:t>
+            </a:r>
+            <a:r>
+              <a:rPr kumimoji="1" lang="ja-JP" altLang="en-US" sz="1200" b="0" i="0" u="none" strike="noStrike" kern="1200" cap="none" spc="0" normalizeH="0" baseline="0" noProof="0" dirty="0">
+                <a:ln>
+                  <a:noFill/>
+                </a:ln>
+                <a:solidFill>
+                  <a:schemeClr val="accent1"/>
+                </a:solidFill>
+                <a:effectLst/>
+                <a:uLnTx/>
+                <a:uFillTx/>
+                <a:latin typeface="Yu Gothic UI Semibold" panose="020B0700000000000000" pitchFamily="50" charset="-128"/>
+                <a:ea typeface="Yu Gothic UI Semibold" panose="020B0700000000000000" pitchFamily="50" charset="-128"/>
+                <a:cs typeface="+mn-cs"/>
+              </a:rPr>
+              <a:t>モデル</a:t>
+            </a:r>
+            <a:endParaRPr kumimoji="1" lang="en-US" altLang="ja-JP" sz="1200" b="0" i="0" u="none" strike="noStrike" kern="1200" cap="none" spc="0" normalizeH="0" baseline="0" noProof="0" dirty="0">
+              <a:ln>
+                <a:noFill/>
+              </a:ln>
+              <a:solidFill>
+                <a:schemeClr val="accent1"/>
+              </a:solidFill>
+              <a:effectLst/>
+              <a:uLnTx/>
+              <a:uFillTx/>
+              <a:latin typeface="Yu Gothic UI Semibold" panose="020B0700000000000000" pitchFamily="50" charset="-128"/>
+              <a:ea typeface="Yu Gothic UI Semibold" panose="020B0700000000000000" pitchFamily="50" charset="-128"/>
+              <a:cs typeface="+mn-cs"/>
+            </a:endParaRPr>
+          </a:p>
+        </p:txBody>
+      </p:sp>
+      <p:sp>
+        <p:nvSpPr>
+          <p:cNvPr id="1047" name="テキスト ボックス 1046">
+            <a:extLst>
+              <a:ext uri="{FF2B5EF4-FFF2-40B4-BE49-F238E27FC236}">
+                <a16:creationId xmlns:a16="http://schemas.microsoft.com/office/drawing/2014/main" id="{2CB7290C-C3BD-E94B-69FD-85F0C59A9C5C}"/>
+              </a:ext>
+            </a:extLst>
+          </p:cNvPr>
+          <p:cNvSpPr txBox="1"/>
+          <p:nvPr/>
+        </p:nvSpPr>
+        <p:spPr>
+          <a:xfrm>
+            <a:off x="7916078" y="1779228"/>
+            <a:ext cx="1036611" cy="276999"/>
+          </a:xfrm>
+          <a:prstGeom prst="rect">
+            <a:avLst/>
+          </a:prstGeom>
+          <a:noFill/>
+        </p:spPr>
+        <p:txBody>
+          <a:bodyPr wrap="square">
+            <a:spAutoFit/>
+          </a:bodyPr>
+          <a:lstStyle/>
+          <a:p>
+            <a:pPr marL="0" marR="0" lvl="0" indent="0" algn="l" defTabSz="914367" rtl="0" eaLnBrk="1" fontAlgn="auto" latinLnBrk="0" hangingPunct="1">
+              <a:lnSpc>
+                <a:spcPct val="100000"/>
+              </a:lnSpc>
+              <a:spcBef>
+                <a:spcPts val="0"/>
+              </a:spcBef>
+              <a:spcAft>
+                <a:spcPts val="0"/>
+              </a:spcAft>
+              <a:buClrTx/>
+              <a:buSzTx/>
+              <a:buFontTx/>
+              <a:buNone/>
+              <a:tabLst/>
+              <a:defRPr/>
+            </a:pPr>
+            <a:r>
+              <a:rPr kumimoji="1" lang="ja-JP" altLang="en-US" sz="1200" b="0" i="0" u="none" strike="noStrike" kern="1200" cap="none" spc="0" normalizeH="0" baseline="0" noProof="0" dirty="0">
+                <a:ln>
+                  <a:noFill/>
+                </a:ln>
+                <a:solidFill>
+                  <a:schemeClr val="accent1"/>
+                </a:solidFill>
+                <a:effectLst/>
+                <a:uLnTx/>
+                <a:uFillTx/>
+                <a:latin typeface="Yu Gothic UI Semibold" panose="020B0700000000000000" pitchFamily="50" charset="-128"/>
+                <a:ea typeface="Yu Gothic UI Semibold" panose="020B0700000000000000" pitchFamily="50" charset="-128"/>
+                <a:cs typeface="+mn-cs"/>
+              </a:rPr>
+              <a:t>ナレッジ検索</a:t>
+            </a:r>
+            <a:endParaRPr kumimoji="1" lang="en-US" altLang="ja-JP" sz="1200" b="0" i="0" u="none" strike="noStrike" kern="1200" cap="none" spc="0" normalizeH="0" baseline="0" noProof="0" dirty="0">
+              <a:ln>
+                <a:noFill/>
+              </a:ln>
+              <a:solidFill>
+                <a:schemeClr val="accent1"/>
+              </a:solidFill>
+              <a:effectLst/>
+              <a:uLnTx/>
+              <a:uFillTx/>
+              <a:latin typeface="Yu Gothic UI Semibold" panose="020B0700000000000000" pitchFamily="50" charset="-128"/>
+              <a:ea typeface="Yu Gothic UI Semibold" panose="020B0700000000000000" pitchFamily="50" charset="-128"/>
+              <a:cs typeface="+mn-cs"/>
+            </a:endParaRPr>
+          </a:p>
+        </p:txBody>
+      </p:sp>
+      <p:sp>
+        <p:nvSpPr>
+          <p:cNvPr id="1048" name="吹き出し: 四角形 1047">
+            <a:extLst>
+              <a:ext uri="{FF2B5EF4-FFF2-40B4-BE49-F238E27FC236}">
+                <a16:creationId xmlns:a16="http://schemas.microsoft.com/office/drawing/2014/main" id="{6BF95266-A6A0-5E27-CB4E-B6FA0D869A2E}"/>
+              </a:ext>
+            </a:extLst>
+          </p:cNvPr>
+          <p:cNvSpPr/>
+          <p:nvPr/>
+        </p:nvSpPr>
+        <p:spPr>
+          <a:xfrm>
+            <a:off x="6335950" y="1177046"/>
+            <a:ext cx="1896894" cy="593387"/>
+          </a:xfrm>
+          <a:prstGeom prst="wedgeRectCallout">
+            <a:avLst>
+              <a:gd name="adj1" fmla="val 15065"/>
+              <a:gd name="adj2" fmla="val 80631"/>
+            </a:avLst>
+          </a:prstGeom>
+          <a:solidFill>
+            <a:srgbClr val="8497B0">
+              <a:alpha val="50196"/>
+            </a:srgbClr>
+          </a:solidFill>
+          <a:ln>
+            <a:noFill/>
+          </a:ln>
+        </p:spPr>
+        <p:style>
+          <a:lnRef idx="2">
+            <a:schemeClr val="accent1">
+              <a:shade val="15000"/>
+            </a:schemeClr>
+          </a:lnRef>
+          <a:fillRef idx="1">
+            <a:schemeClr val="accent1"/>
+          </a:fillRef>
+          <a:effectRef idx="0">
+            <a:schemeClr val="accent1"/>
+          </a:effectRef>
+          <a:fontRef idx="minor">
+            <a:schemeClr val="lt1"/>
+          </a:fontRef>
+        </p:style>
+        <p:txBody>
+          <a:bodyPr rtlCol="0" anchor="ctr"/>
+          <a:lstStyle/>
+          <a:p>
+            <a:pPr algn="ctr"/>
+            <a:endParaRPr kumimoji="1" lang="ja-JP" altLang="en-US"/>
+          </a:p>
+        </p:txBody>
+      </p:sp>
+      <p:sp>
+        <p:nvSpPr>
+          <p:cNvPr id="36" name="テキスト ボックス 35">
+            <a:extLst>
+              <a:ext uri="{FF2B5EF4-FFF2-40B4-BE49-F238E27FC236}">
+                <a16:creationId xmlns:a16="http://schemas.microsoft.com/office/drawing/2014/main" id="{F6BAF898-C2C6-98F6-FC07-2D2AE4860CE6}"/>
+              </a:ext>
+            </a:extLst>
+          </p:cNvPr>
+          <p:cNvSpPr txBox="1"/>
+          <p:nvPr/>
+        </p:nvSpPr>
+        <p:spPr>
+          <a:xfrm>
+            <a:off x="6365530" y="1244772"/>
+            <a:ext cx="1897811" cy="461665"/>
+          </a:xfrm>
+          <a:prstGeom prst="rect">
+            <a:avLst/>
+          </a:prstGeom>
+          <a:noFill/>
+        </p:spPr>
+        <p:txBody>
+          <a:bodyPr wrap="square" rtlCol="0">
+            <a:spAutoFit/>
+          </a:bodyPr>
+          <a:lstStyle/>
+          <a:p>
+            <a:pPr algn="l"/>
+            <a:r>
+              <a:rPr kumimoji="1" lang="ja-JP" altLang="en-US" sz="1200" dirty="0">
+                <a:latin typeface="Yu Gothic UI Semibold" panose="020B0700000000000000" pitchFamily="50" charset="-128"/>
+                <a:ea typeface="Yu Gothic UI Semibold" panose="020B0700000000000000" pitchFamily="50" charset="-128"/>
+              </a:rPr>
+              <a:t>質問</a:t>
+            </a:r>
+            <a:r>
+              <a:rPr kumimoji="1" lang="en-US" altLang="ja-JP" sz="1200" dirty="0">
+                <a:latin typeface="Yu Gothic UI Semibold" panose="020B0700000000000000" pitchFamily="50" charset="-128"/>
+                <a:ea typeface="Yu Gothic UI Semibold" panose="020B0700000000000000" pitchFamily="50" charset="-128"/>
+              </a:rPr>
+              <a:t>/</a:t>
+            </a:r>
+            <a:r>
+              <a:rPr kumimoji="1" lang="ja-JP" altLang="en-US" sz="1200" dirty="0">
+                <a:latin typeface="Yu Gothic UI Semibold" panose="020B0700000000000000" pitchFamily="50" charset="-128"/>
+                <a:ea typeface="Yu Gothic UI Semibold" panose="020B0700000000000000" pitchFamily="50" charset="-128"/>
+              </a:rPr>
+              <a:t>過去のチャット履歴をもとに検索クエリを生成</a:t>
+            </a:r>
+          </a:p>
+        </p:txBody>
+      </p:sp>
+      <p:sp>
+        <p:nvSpPr>
+          <p:cNvPr id="1049" name="吹き出し: 四角形 1048">
+            <a:extLst>
+              <a:ext uri="{FF2B5EF4-FFF2-40B4-BE49-F238E27FC236}">
+                <a16:creationId xmlns:a16="http://schemas.microsoft.com/office/drawing/2014/main" id="{BA0F4DB2-B8AF-AA55-C9B9-B872ABD1AB02}"/>
+              </a:ext>
+            </a:extLst>
+          </p:cNvPr>
+          <p:cNvSpPr/>
+          <p:nvPr/>
+        </p:nvSpPr>
+        <p:spPr>
+          <a:xfrm>
+            <a:off x="7143345" y="3800271"/>
+            <a:ext cx="1806102" cy="593387"/>
+          </a:xfrm>
+          <a:prstGeom prst="wedgeRectCallout">
+            <a:avLst>
+              <a:gd name="adj1" fmla="val 13526"/>
+              <a:gd name="adj2" fmla="val 82270"/>
+            </a:avLst>
+          </a:prstGeom>
+          <a:solidFill>
+            <a:srgbClr val="8497B0">
+              <a:alpha val="50196"/>
+            </a:srgbClr>
+          </a:solidFill>
+          <a:ln>
+            <a:noFill/>
+          </a:ln>
+        </p:spPr>
+        <p:style>
+          <a:lnRef idx="2">
+            <a:schemeClr val="accent1">
+              <a:shade val="15000"/>
+            </a:schemeClr>
+          </a:lnRef>
+          <a:fillRef idx="1">
+            <a:schemeClr val="accent1"/>
+          </a:fillRef>
+          <a:effectRef idx="0">
+            <a:schemeClr val="accent1"/>
+          </a:effectRef>
+          <a:fontRef idx="minor">
+            <a:schemeClr val="lt1"/>
+          </a:fontRef>
+        </p:style>
+        <p:txBody>
+          <a:bodyPr rtlCol="0" anchor="ctr"/>
+          <a:lstStyle/>
+          <a:p>
+            <a:pPr algn="ctr"/>
+            <a:endParaRPr kumimoji="1" lang="ja-JP" altLang="en-US"/>
+          </a:p>
+        </p:txBody>
+      </p:sp>
+      <p:sp>
+        <p:nvSpPr>
+          <p:cNvPr id="1033" name="テキスト ボックス 1032">
+            <a:extLst>
+              <a:ext uri="{FF2B5EF4-FFF2-40B4-BE49-F238E27FC236}">
+                <a16:creationId xmlns:a16="http://schemas.microsoft.com/office/drawing/2014/main" id="{8CBC43E1-F4AC-849A-7469-4609A0A06875}"/>
+              </a:ext>
+            </a:extLst>
+          </p:cNvPr>
+          <p:cNvSpPr txBox="1"/>
+          <p:nvPr/>
+        </p:nvSpPr>
+        <p:spPr>
+          <a:xfrm>
+            <a:off x="7211438" y="3877727"/>
+            <a:ext cx="1690685" cy="461665"/>
+          </a:xfrm>
+          <a:prstGeom prst="rect">
+            <a:avLst/>
+          </a:prstGeom>
+          <a:noFill/>
+        </p:spPr>
+        <p:txBody>
+          <a:bodyPr wrap="square" rtlCol="0">
+            <a:spAutoFit/>
+          </a:bodyPr>
+          <a:lstStyle/>
+          <a:p>
+            <a:pPr algn="l"/>
+            <a:r>
+              <a:rPr kumimoji="1" lang="ja-JP" altLang="en-US" sz="1200" dirty="0">
+                <a:latin typeface="Yu Gothic UI Semibold" panose="020B0700000000000000" pitchFamily="50" charset="-128"/>
+                <a:ea typeface="Yu Gothic UI Semibold" panose="020B0700000000000000" pitchFamily="50" charset="-128"/>
+              </a:rPr>
+              <a:t>検索結果をもとに</a:t>
+            </a:r>
+            <a:endParaRPr kumimoji="1" lang="en-US" altLang="ja-JP" sz="1200" dirty="0">
+              <a:latin typeface="Yu Gothic UI Semibold" panose="020B0700000000000000" pitchFamily="50" charset="-128"/>
+              <a:ea typeface="Yu Gothic UI Semibold" panose="020B0700000000000000" pitchFamily="50" charset="-128"/>
+            </a:endParaRPr>
+          </a:p>
+          <a:p>
+            <a:pPr algn="l"/>
+            <a:r>
+              <a:rPr lang="ja-JP" altLang="en-US" sz="1200" dirty="0">
+                <a:latin typeface="Yu Gothic UI Semibold" panose="020B0700000000000000" pitchFamily="50" charset="-128"/>
+                <a:ea typeface="Yu Gothic UI Semibold" panose="020B0700000000000000" pitchFamily="50" charset="-128"/>
+              </a:rPr>
+              <a:t>自然言語で回答を作成</a:t>
+            </a:r>
+            <a:endParaRPr kumimoji="1" lang="ja-JP" altLang="en-US" sz="1200" dirty="0">
+              <a:latin typeface="Yu Gothic UI Semibold" panose="020B0700000000000000" pitchFamily="50" charset="-128"/>
+              <a:ea typeface="Yu Gothic UI Semibold" panose="020B0700000000000000" pitchFamily="50" charset="-128"/>
+            </a:endParaRPr>
+          </a:p>
+        </p:txBody>
+      </p:sp>
+      <p:sp>
+        <p:nvSpPr>
+          <p:cNvPr id="1050" name="吹き出し: 四角形 1049">
+            <a:extLst>
+              <a:ext uri="{FF2B5EF4-FFF2-40B4-BE49-F238E27FC236}">
+                <a16:creationId xmlns:a16="http://schemas.microsoft.com/office/drawing/2014/main" id="{61918D37-3615-F557-89A0-F6D1281FD813}"/>
+              </a:ext>
+            </a:extLst>
+          </p:cNvPr>
+          <p:cNvSpPr/>
+          <p:nvPr/>
+        </p:nvSpPr>
+        <p:spPr>
+          <a:xfrm>
+            <a:off x="10635574" y="3855396"/>
+            <a:ext cx="1284051" cy="473412"/>
+          </a:xfrm>
+          <a:prstGeom prst="wedgeRectCallout">
+            <a:avLst>
+              <a:gd name="adj1" fmla="val 4269"/>
+              <a:gd name="adj2" fmla="val -89136"/>
+            </a:avLst>
+          </a:prstGeom>
+          <a:solidFill>
+            <a:srgbClr val="8497B0">
+              <a:alpha val="50196"/>
+            </a:srgbClr>
+          </a:solidFill>
+          <a:ln>
+            <a:noFill/>
+          </a:ln>
+        </p:spPr>
+        <p:style>
+          <a:lnRef idx="2">
+            <a:schemeClr val="accent1">
+              <a:shade val="15000"/>
+            </a:schemeClr>
+          </a:lnRef>
+          <a:fillRef idx="1">
+            <a:schemeClr val="accent1"/>
+          </a:fillRef>
+          <a:effectRef idx="0">
+            <a:schemeClr val="accent1"/>
+          </a:effectRef>
+          <a:fontRef idx="minor">
+            <a:schemeClr val="lt1"/>
+          </a:fontRef>
+        </p:style>
+        <p:txBody>
+          <a:bodyPr rtlCol="0" anchor="ctr"/>
+          <a:lstStyle/>
+          <a:p>
+            <a:pPr algn="ctr"/>
+            <a:endParaRPr kumimoji="1" lang="ja-JP" altLang="en-US"/>
+          </a:p>
+        </p:txBody>
+      </p:sp>
+      <p:sp>
+        <p:nvSpPr>
+          <p:cNvPr id="1044" name="テキスト ボックス 1043">
+            <a:extLst>
+              <a:ext uri="{FF2B5EF4-FFF2-40B4-BE49-F238E27FC236}">
+                <a16:creationId xmlns:a16="http://schemas.microsoft.com/office/drawing/2014/main" id="{498B4D2D-9EA8-6FC2-CA89-D9119D5464B0}"/>
+              </a:ext>
+            </a:extLst>
+          </p:cNvPr>
+          <p:cNvSpPr txBox="1"/>
+          <p:nvPr/>
+        </p:nvSpPr>
+        <p:spPr>
+          <a:xfrm>
+            <a:off x="10657357" y="3877727"/>
+            <a:ext cx="1223360" cy="461665"/>
+          </a:xfrm>
+          <a:prstGeom prst="rect">
+            <a:avLst/>
+          </a:prstGeom>
+          <a:noFill/>
+        </p:spPr>
+        <p:txBody>
+          <a:bodyPr wrap="square" rtlCol="0">
+            <a:spAutoFit/>
+          </a:bodyPr>
+          <a:lstStyle/>
+          <a:p>
+            <a:pPr algn="l"/>
+            <a:r>
+              <a:rPr kumimoji="1" lang="ja-JP" altLang="en-US" sz="1200" dirty="0">
+                <a:latin typeface="Yu Gothic UI Semibold" panose="020B0700000000000000" pitchFamily="50" charset="-128"/>
+                <a:ea typeface="Yu Gothic UI Semibold" panose="020B0700000000000000" pitchFamily="50" charset="-128"/>
+              </a:rPr>
+              <a:t>情報をテキストとして抽出</a:t>
+            </a:r>
+          </a:p>
+        </p:txBody>
+      </p:sp>
       <p:pic>
         <p:nvPicPr>
-          <p:cNvPr id="1041" name="図 1040">
-            <a:extLst>
-              <a:ext uri="{FF2B5EF4-FFF2-40B4-BE49-F238E27FC236}">
-                <a16:creationId xmlns:a16="http://schemas.microsoft.com/office/drawing/2014/main" id="{6EC736A3-5253-5F01-C96B-5B9DC4680B54}"/>
+          <p:cNvPr id="1054" name="Picture 2" descr="App Service の料金 | Microsoft Azure">
+            <a:extLst>
+              <a:ext uri="{FF2B5EF4-FFF2-40B4-BE49-F238E27FC236}">
+                <a16:creationId xmlns:a16="http://schemas.microsoft.com/office/drawing/2014/main" id="{DFBA8350-6F85-2178-6AFA-1C01B8886C0A}"/>
+              </a:ext>
+            </a:extLst>
+          </p:cNvPr>
+          <p:cNvPicPr>
+            <a:picLocks noChangeAspect="1" noChangeArrowheads="1"/>
+          </p:cNvPicPr>
+          <p:nvPr/>
+        </p:nvPicPr>
+        <p:blipFill>
+          <a:blip r:embed="rId15">
+            <a:extLst>
+              <a:ext uri="{28A0092B-C50C-407E-A947-70E740481C1C}">
+                <a14:useLocalDpi xmlns:a14="http://schemas.microsoft.com/office/drawing/2010/main" val="0"/>
+              </a:ext>
+            </a:extLst>
+          </a:blip>
+          <a:srcRect/>
+          <a:stretch>
+            <a:fillRect/>
+          </a:stretch>
+        </p:blipFill>
+        <p:spPr bwMode="auto">
+          <a:xfrm>
+            <a:off x="4124528" y="742038"/>
+            <a:ext cx="866573" cy="454951"/>
+          </a:xfrm>
+          <a:prstGeom prst="rect">
+            <a:avLst/>
+          </a:prstGeom>
+          <a:noFill/>
+          <a:extLst>
+            <a:ext uri="{909E8E84-426E-40DD-AFC4-6F175D3DCCD1}">
+              <a14:hiddenFill xmlns:a14="http://schemas.microsoft.com/office/drawing/2010/main">
+                <a:solidFill>
+                  <a:srgbClr val="FFFFFF"/>
+                </a:solidFill>
+              </a14:hiddenFill>
+            </a:ext>
+          </a:extLst>
+        </p:spPr>
+      </p:pic>
+      <p:pic>
+        <p:nvPicPr>
+          <p:cNvPr id="3" name="図 2">
+            <a:extLst>
+              <a:ext uri="{FF2B5EF4-FFF2-40B4-BE49-F238E27FC236}">
+                <a16:creationId xmlns:a16="http://schemas.microsoft.com/office/drawing/2014/main" id="{1CC7E4BF-506E-AD05-FECB-18677195423C}"/>
               </a:ext>
             </a:extLst>
           </p:cNvPr>
@@ -7826,14 +8368,43 @@
           <p:nvPr/>
         </p:nvPicPr>
         <p:blipFill rotWithShape="1">
-          <a:blip r:embed="rId15"/>
-          <a:srcRect l="29303" t="19371" r="6390"/>
+          <a:blip r:embed="rId16"/>
+          <a:srcRect l="2691" t="34959" r="62187" b="39512"/>
           <a:stretch/>
         </p:blipFill>
         <p:spPr>
           <a:xfrm>
-            <a:off x="10211317" y="1363708"/>
-            <a:ext cx="1659670" cy="1465356"/>
+            <a:off x="1795346" y="3992137"/>
+            <a:ext cx="3813717" cy="1750742"/>
+          </a:xfrm>
+          <a:prstGeom prst="rect">
+            <a:avLst/>
+          </a:prstGeom>
+        </p:spPr>
+      </p:pic>
+      <p:pic>
+        <p:nvPicPr>
+          <p:cNvPr id="4" name="図 3">
+            <a:extLst>
+              <a:ext uri="{FF2B5EF4-FFF2-40B4-BE49-F238E27FC236}">
+                <a16:creationId xmlns:a16="http://schemas.microsoft.com/office/drawing/2014/main" id="{B170ABA3-B1C9-8189-F157-0CE951C3D446}"/>
+              </a:ext>
+            </a:extLst>
+          </p:cNvPr>
+          <p:cNvPicPr>
+            <a:picLocks noChangeAspect="1"/>
+          </p:cNvPicPr>
+          <p:nvPr/>
+        </p:nvPicPr>
+        <p:blipFill rotWithShape="1">
+          <a:blip r:embed="rId17"/>
+          <a:srcRect l="2432" r="1"/>
+          <a:stretch/>
+        </p:blipFill>
+        <p:spPr>
+          <a:xfrm>
+            <a:off x="10228083" y="1385741"/>
+            <a:ext cx="1621497" cy="1442302"/>
           </a:xfrm>
           <a:prstGeom prst="rect">
             <a:avLst/>
@@ -7885,7 +8456,7 @@
           <p:nvPr/>
         </p:nvPicPr>
         <p:blipFill>
-          <a:blip r:embed="rId16">
+          <a:blip r:embed="rId18">
             <a:extLst>
               <a:ext uri="{28A0092B-C50C-407E-A947-70E740481C1C}">
                 <a14:useLocalDpi xmlns:a14="http://schemas.microsoft.com/office/drawing/2010/main" val="0"/>
@@ -7915,577 +8486,6 @@
               </a14:hiddenFill>
             </a:ext>
           </a:extLst>
-        </p:spPr>
-      </p:pic>
-      <p:sp>
-        <p:nvSpPr>
-          <p:cNvPr id="1045" name="テキスト ボックス 1044">
-            <a:extLst>
-              <a:ext uri="{FF2B5EF4-FFF2-40B4-BE49-F238E27FC236}">
-                <a16:creationId xmlns:a16="http://schemas.microsoft.com/office/drawing/2014/main" id="{8488F53D-8FBD-D11B-495D-AB20C28F8F62}"/>
-              </a:ext>
-            </a:extLst>
-          </p:cNvPr>
-          <p:cNvSpPr txBox="1"/>
-          <p:nvPr/>
-        </p:nvSpPr>
-        <p:spPr>
-          <a:xfrm>
-            <a:off x="7997142" y="4564583"/>
-            <a:ext cx="887454" cy="276999"/>
-          </a:xfrm>
-          <a:prstGeom prst="rect">
-            <a:avLst/>
-          </a:prstGeom>
-          <a:noFill/>
-        </p:spPr>
-        <p:txBody>
-          <a:bodyPr wrap="square">
-            <a:spAutoFit/>
-          </a:bodyPr>
-          <a:lstStyle/>
-          <a:p>
-            <a:pPr marL="0" marR="0" lvl="0" indent="0" algn="l" defTabSz="914367" rtl="0" eaLnBrk="1" fontAlgn="auto" latinLnBrk="0" hangingPunct="1">
-              <a:lnSpc>
-                <a:spcPct val="100000"/>
-              </a:lnSpc>
-              <a:spcBef>
-                <a:spcPts val="0"/>
-              </a:spcBef>
-              <a:spcAft>
-                <a:spcPts val="0"/>
-              </a:spcAft>
-              <a:buClrTx/>
-              <a:buSzTx/>
-              <a:buFontTx/>
-              <a:buNone/>
-              <a:tabLst/>
-              <a:defRPr/>
-            </a:pPr>
-            <a:r>
-              <a:rPr kumimoji="1" lang="en-US" altLang="ja-JP" sz="1200" b="0" i="0" u="none" strike="noStrike" kern="1200" cap="none" spc="0" normalizeH="0" baseline="0" noProof="0" dirty="0">
-                <a:ln>
-                  <a:noFill/>
-                </a:ln>
-                <a:solidFill>
-                  <a:schemeClr val="accent1"/>
-                </a:solidFill>
-                <a:effectLst/>
-                <a:uLnTx/>
-                <a:uFillTx/>
-                <a:latin typeface="Yu Gothic UI Semibold" panose="020B0700000000000000" pitchFamily="50" charset="-128"/>
-                <a:ea typeface="Yu Gothic UI Semibold" panose="020B0700000000000000" pitchFamily="50" charset="-128"/>
-                <a:cs typeface="+mn-cs"/>
-              </a:rPr>
-              <a:t>GPT</a:t>
-            </a:r>
-            <a:r>
-              <a:rPr kumimoji="1" lang="ja-JP" altLang="en-US" sz="1200" b="0" i="0" u="none" strike="noStrike" kern="1200" cap="none" spc="0" normalizeH="0" baseline="0" noProof="0" dirty="0">
-                <a:ln>
-                  <a:noFill/>
-                </a:ln>
-                <a:solidFill>
-                  <a:schemeClr val="accent1"/>
-                </a:solidFill>
-                <a:effectLst/>
-                <a:uLnTx/>
-                <a:uFillTx/>
-                <a:latin typeface="Yu Gothic UI Semibold" panose="020B0700000000000000" pitchFamily="50" charset="-128"/>
-                <a:ea typeface="Yu Gothic UI Semibold" panose="020B0700000000000000" pitchFamily="50" charset="-128"/>
-                <a:cs typeface="+mn-cs"/>
-              </a:rPr>
-              <a:t>モデル</a:t>
-            </a:r>
-            <a:endParaRPr kumimoji="1" lang="en-US" altLang="ja-JP" sz="1200" b="0" i="0" u="none" strike="noStrike" kern="1200" cap="none" spc="0" normalizeH="0" baseline="0" noProof="0" dirty="0">
-              <a:ln>
-                <a:noFill/>
-              </a:ln>
-              <a:solidFill>
-                <a:schemeClr val="accent1"/>
-              </a:solidFill>
-              <a:effectLst/>
-              <a:uLnTx/>
-              <a:uFillTx/>
-              <a:latin typeface="Yu Gothic UI Semibold" panose="020B0700000000000000" pitchFamily="50" charset="-128"/>
-              <a:ea typeface="Yu Gothic UI Semibold" panose="020B0700000000000000" pitchFamily="50" charset="-128"/>
-              <a:cs typeface="+mn-cs"/>
-            </a:endParaRPr>
-          </a:p>
-        </p:txBody>
-      </p:sp>
-      <p:sp>
-        <p:nvSpPr>
-          <p:cNvPr id="1047" name="テキスト ボックス 1046">
-            <a:extLst>
-              <a:ext uri="{FF2B5EF4-FFF2-40B4-BE49-F238E27FC236}">
-                <a16:creationId xmlns:a16="http://schemas.microsoft.com/office/drawing/2014/main" id="{2CB7290C-C3BD-E94B-69FD-85F0C59A9C5C}"/>
-              </a:ext>
-            </a:extLst>
-          </p:cNvPr>
-          <p:cNvSpPr txBox="1"/>
-          <p:nvPr/>
-        </p:nvSpPr>
-        <p:spPr>
-          <a:xfrm>
-            <a:off x="7916078" y="1779228"/>
-            <a:ext cx="1036611" cy="276999"/>
-          </a:xfrm>
-          <a:prstGeom prst="rect">
-            <a:avLst/>
-          </a:prstGeom>
-          <a:noFill/>
-        </p:spPr>
-        <p:txBody>
-          <a:bodyPr wrap="square">
-            <a:spAutoFit/>
-          </a:bodyPr>
-          <a:lstStyle/>
-          <a:p>
-            <a:pPr marL="0" marR="0" lvl="0" indent="0" algn="l" defTabSz="914367" rtl="0" eaLnBrk="1" fontAlgn="auto" latinLnBrk="0" hangingPunct="1">
-              <a:lnSpc>
-                <a:spcPct val="100000"/>
-              </a:lnSpc>
-              <a:spcBef>
-                <a:spcPts val="0"/>
-              </a:spcBef>
-              <a:spcAft>
-                <a:spcPts val="0"/>
-              </a:spcAft>
-              <a:buClrTx/>
-              <a:buSzTx/>
-              <a:buFontTx/>
-              <a:buNone/>
-              <a:tabLst/>
-              <a:defRPr/>
-            </a:pPr>
-            <a:r>
-              <a:rPr kumimoji="1" lang="ja-JP" altLang="en-US" sz="1200" b="0" i="0" u="none" strike="noStrike" kern="1200" cap="none" spc="0" normalizeH="0" baseline="0" noProof="0" dirty="0">
-                <a:ln>
-                  <a:noFill/>
-                </a:ln>
-                <a:solidFill>
-                  <a:schemeClr val="accent1"/>
-                </a:solidFill>
-                <a:effectLst/>
-                <a:uLnTx/>
-                <a:uFillTx/>
-                <a:latin typeface="Yu Gothic UI Semibold" panose="020B0700000000000000" pitchFamily="50" charset="-128"/>
-                <a:ea typeface="Yu Gothic UI Semibold" panose="020B0700000000000000" pitchFamily="50" charset="-128"/>
-                <a:cs typeface="+mn-cs"/>
-              </a:rPr>
-              <a:t>ナレッジ検索</a:t>
-            </a:r>
-            <a:endParaRPr kumimoji="1" lang="en-US" altLang="ja-JP" sz="1200" b="0" i="0" u="none" strike="noStrike" kern="1200" cap="none" spc="0" normalizeH="0" baseline="0" noProof="0" dirty="0">
-              <a:ln>
-                <a:noFill/>
-              </a:ln>
-              <a:solidFill>
-                <a:schemeClr val="accent1"/>
-              </a:solidFill>
-              <a:effectLst/>
-              <a:uLnTx/>
-              <a:uFillTx/>
-              <a:latin typeface="Yu Gothic UI Semibold" panose="020B0700000000000000" pitchFamily="50" charset="-128"/>
-              <a:ea typeface="Yu Gothic UI Semibold" panose="020B0700000000000000" pitchFamily="50" charset="-128"/>
-              <a:cs typeface="+mn-cs"/>
-            </a:endParaRPr>
-          </a:p>
-        </p:txBody>
-      </p:sp>
-      <p:sp>
-        <p:nvSpPr>
-          <p:cNvPr id="1048" name="吹き出し: 四角形 1047">
-            <a:extLst>
-              <a:ext uri="{FF2B5EF4-FFF2-40B4-BE49-F238E27FC236}">
-                <a16:creationId xmlns:a16="http://schemas.microsoft.com/office/drawing/2014/main" id="{6BF95266-A6A0-5E27-CB4E-B6FA0D869A2E}"/>
-              </a:ext>
-            </a:extLst>
-          </p:cNvPr>
-          <p:cNvSpPr/>
-          <p:nvPr/>
-        </p:nvSpPr>
-        <p:spPr>
-          <a:xfrm>
-            <a:off x="6335950" y="1177046"/>
-            <a:ext cx="1896894" cy="593387"/>
-          </a:xfrm>
-          <a:prstGeom prst="wedgeRectCallout">
-            <a:avLst>
-              <a:gd name="adj1" fmla="val 15065"/>
-              <a:gd name="adj2" fmla="val 80631"/>
-            </a:avLst>
-          </a:prstGeom>
-          <a:solidFill>
-            <a:srgbClr val="8497B0">
-              <a:alpha val="50196"/>
-            </a:srgbClr>
-          </a:solidFill>
-          <a:ln>
-            <a:noFill/>
-          </a:ln>
-        </p:spPr>
-        <p:style>
-          <a:lnRef idx="2">
-            <a:schemeClr val="accent1">
-              <a:shade val="15000"/>
-            </a:schemeClr>
-          </a:lnRef>
-          <a:fillRef idx="1">
-            <a:schemeClr val="accent1"/>
-          </a:fillRef>
-          <a:effectRef idx="0">
-            <a:schemeClr val="accent1"/>
-          </a:effectRef>
-          <a:fontRef idx="minor">
-            <a:schemeClr val="lt1"/>
-          </a:fontRef>
-        </p:style>
-        <p:txBody>
-          <a:bodyPr rtlCol="0" anchor="ctr"/>
-          <a:lstStyle/>
-          <a:p>
-            <a:pPr algn="ctr"/>
-            <a:endParaRPr kumimoji="1" lang="ja-JP" altLang="en-US"/>
-          </a:p>
-        </p:txBody>
-      </p:sp>
-      <p:sp>
-        <p:nvSpPr>
-          <p:cNvPr id="36" name="テキスト ボックス 35">
-            <a:extLst>
-              <a:ext uri="{FF2B5EF4-FFF2-40B4-BE49-F238E27FC236}">
-                <a16:creationId xmlns:a16="http://schemas.microsoft.com/office/drawing/2014/main" id="{F6BAF898-C2C6-98F6-FC07-2D2AE4860CE6}"/>
-              </a:ext>
-            </a:extLst>
-          </p:cNvPr>
-          <p:cNvSpPr txBox="1"/>
-          <p:nvPr/>
-        </p:nvSpPr>
-        <p:spPr>
-          <a:xfrm>
-            <a:off x="6365530" y="1244772"/>
-            <a:ext cx="1897811" cy="461665"/>
-          </a:xfrm>
-          <a:prstGeom prst="rect">
-            <a:avLst/>
-          </a:prstGeom>
-          <a:noFill/>
-        </p:spPr>
-        <p:txBody>
-          <a:bodyPr wrap="square" rtlCol="0">
-            <a:spAutoFit/>
-          </a:bodyPr>
-          <a:lstStyle/>
-          <a:p>
-            <a:pPr algn="l"/>
-            <a:r>
-              <a:rPr kumimoji="1" lang="ja-JP" altLang="en-US" sz="1200" dirty="0">
-                <a:latin typeface="Yu Gothic UI Semibold" panose="020B0700000000000000" pitchFamily="50" charset="-128"/>
-                <a:ea typeface="Yu Gothic UI Semibold" panose="020B0700000000000000" pitchFamily="50" charset="-128"/>
-              </a:rPr>
-              <a:t>質問</a:t>
-            </a:r>
-            <a:r>
-              <a:rPr kumimoji="1" lang="en-US" altLang="ja-JP" sz="1200" dirty="0">
-                <a:latin typeface="Yu Gothic UI Semibold" panose="020B0700000000000000" pitchFamily="50" charset="-128"/>
-                <a:ea typeface="Yu Gothic UI Semibold" panose="020B0700000000000000" pitchFamily="50" charset="-128"/>
-              </a:rPr>
-              <a:t>/</a:t>
-            </a:r>
-            <a:r>
-              <a:rPr kumimoji="1" lang="ja-JP" altLang="en-US" sz="1200" dirty="0">
-                <a:latin typeface="Yu Gothic UI Semibold" panose="020B0700000000000000" pitchFamily="50" charset="-128"/>
-                <a:ea typeface="Yu Gothic UI Semibold" panose="020B0700000000000000" pitchFamily="50" charset="-128"/>
-              </a:rPr>
-              <a:t>過去のチャット履歴をもとに検索クエリを生成</a:t>
-            </a:r>
-          </a:p>
-        </p:txBody>
-      </p:sp>
-      <p:sp>
-        <p:nvSpPr>
-          <p:cNvPr id="1049" name="吹き出し: 四角形 1048">
-            <a:extLst>
-              <a:ext uri="{FF2B5EF4-FFF2-40B4-BE49-F238E27FC236}">
-                <a16:creationId xmlns:a16="http://schemas.microsoft.com/office/drawing/2014/main" id="{BA0F4DB2-B8AF-AA55-C9B9-B872ABD1AB02}"/>
-              </a:ext>
-            </a:extLst>
-          </p:cNvPr>
-          <p:cNvSpPr/>
-          <p:nvPr/>
-        </p:nvSpPr>
-        <p:spPr>
-          <a:xfrm>
-            <a:off x="7143345" y="3800271"/>
-            <a:ext cx="1806102" cy="593387"/>
-          </a:xfrm>
-          <a:prstGeom prst="wedgeRectCallout">
-            <a:avLst>
-              <a:gd name="adj1" fmla="val 13526"/>
-              <a:gd name="adj2" fmla="val 82270"/>
-            </a:avLst>
-          </a:prstGeom>
-          <a:solidFill>
-            <a:srgbClr val="8497B0">
-              <a:alpha val="50196"/>
-            </a:srgbClr>
-          </a:solidFill>
-          <a:ln>
-            <a:noFill/>
-          </a:ln>
-        </p:spPr>
-        <p:style>
-          <a:lnRef idx="2">
-            <a:schemeClr val="accent1">
-              <a:shade val="15000"/>
-            </a:schemeClr>
-          </a:lnRef>
-          <a:fillRef idx="1">
-            <a:schemeClr val="accent1"/>
-          </a:fillRef>
-          <a:effectRef idx="0">
-            <a:schemeClr val="accent1"/>
-          </a:effectRef>
-          <a:fontRef idx="minor">
-            <a:schemeClr val="lt1"/>
-          </a:fontRef>
-        </p:style>
-        <p:txBody>
-          <a:bodyPr rtlCol="0" anchor="ctr"/>
-          <a:lstStyle/>
-          <a:p>
-            <a:pPr algn="ctr"/>
-            <a:endParaRPr kumimoji="1" lang="ja-JP" altLang="en-US"/>
-          </a:p>
-        </p:txBody>
-      </p:sp>
-      <p:sp>
-        <p:nvSpPr>
-          <p:cNvPr id="1033" name="テキスト ボックス 1032">
-            <a:extLst>
-              <a:ext uri="{FF2B5EF4-FFF2-40B4-BE49-F238E27FC236}">
-                <a16:creationId xmlns:a16="http://schemas.microsoft.com/office/drawing/2014/main" id="{8CBC43E1-F4AC-849A-7469-4609A0A06875}"/>
-              </a:ext>
-            </a:extLst>
-          </p:cNvPr>
-          <p:cNvSpPr txBox="1"/>
-          <p:nvPr/>
-        </p:nvSpPr>
-        <p:spPr>
-          <a:xfrm>
-            <a:off x="7211438" y="3877727"/>
-            <a:ext cx="1690685" cy="461665"/>
-          </a:xfrm>
-          <a:prstGeom prst="rect">
-            <a:avLst/>
-          </a:prstGeom>
-          <a:noFill/>
-        </p:spPr>
-        <p:txBody>
-          <a:bodyPr wrap="square" rtlCol="0">
-            <a:spAutoFit/>
-          </a:bodyPr>
-          <a:lstStyle/>
-          <a:p>
-            <a:pPr algn="l"/>
-            <a:r>
-              <a:rPr kumimoji="1" lang="ja-JP" altLang="en-US" sz="1200" dirty="0">
-                <a:latin typeface="Yu Gothic UI Semibold" panose="020B0700000000000000" pitchFamily="50" charset="-128"/>
-                <a:ea typeface="Yu Gothic UI Semibold" panose="020B0700000000000000" pitchFamily="50" charset="-128"/>
-              </a:rPr>
-              <a:t>検索結果をもとに</a:t>
-            </a:r>
-            <a:endParaRPr kumimoji="1" lang="en-US" altLang="ja-JP" sz="1200" dirty="0">
-              <a:latin typeface="Yu Gothic UI Semibold" panose="020B0700000000000000" pitchFamily="50" charset="-128"/>
-              <a:ea typeface="Yu Gothic UI Semibold" panose="020B0700000000000000" pitchFamily="50" charset="-128"/>
-            </a:endParaRPr>
-          </a:p>
-          <a:p>
-            <a:pPr algn="l"/>
-            <a:r>
-              <a:rPr lang="ja-JP" altLang="en-US" sz="1200" dirty="0">
-                <a:latin typeface="Yu Gothic UI Semibold" panose="020B0700000000000000" pitchFamily="50" charset="-128"/>
-                <a:ea typeface="Yu Gothic UI Semibold" panose="020B0700000000000000" pitchFamily="50" charset="-128"/>
-              </a:rPr>
-              <a:t>自然言語で回答を作成</a:t>
-            </a:r>
-            <a:endParaRPr kumimoji="1" lang="ja-JP" altLang="en-US" sz="1200" dirty="0">
-              <a:latin typeface="Yu Gothic UI Semibold" panose="020B0700000000000000" pitchFamily="50" charset="-128"/>
-              <a:ea typeface="Yu Gothic UI Semibold" panose="020B0700000000000000" pitchFamily="50" charset="-128"/>
-            </a:endParaRPr>
-          </a:p>
-        </p:txBody>
-      </p:sp>
-      <p:sp>
-        <p:nvSpPr>
-          <p:cNvPr id="1050" name="吹き出し: 四角形 1049">
-            <a:extLst>
-              <a:ext uri="{FF2B5EF4-FFF2-40B4-BE49-F238E27FC236}">
-                <a16:creationId xmlns:a16="http://schemas.microsoft.com/office/drawing/2014/main" id="{61918D37-3615-F557-89A0-F6D1281FD813}"/>
-              </a:ext>
-            </a:extLst>
-          </p:cNvPr>
-          <p:cNvSpPr/>
-          <p:nvPr/>
-        </p:nvSpPr>
-        <p:spPr>
-          <a:xfrm>
-            <a:off x="10635574" y="3855396"/>
-            <a:ext cx="1284051" cy="473412"/>
-          </a:xfrm>
-          <a:prstGeom prst="wedgeRectCallout">
-            <a:avLst>
-              <a:gd name="adj1" fmla="val 4269"/>
-              <a:gd name="adj2" fmla="val -89136"/>
-            </a:avLst>
-          </a:prstGeom>
-          <a:solidFill>
-            <a:srgbClr val="8497B0">
-              <a:alpha val="50196"/>
-            </a:srgbClr>
-          </a:solidFill>
-          <a:ln>
-            <a:noFill/>
-          </a:ln>
-        </p:spPr>
-        <p:style>
-          <a:lnRef idx="2">
-            <a:schemeClr val="accent1">
-              <a:shade val="15000"/>
-            </a:schemeClr>
-          </a:lnRef>
-          <a:fillRef idx="1">
-            <a:schemeClr val="accent1"/>
-          </a:fillRef>
-          <a:effectRef idx="0">
-            <a:schemeClr val="accent1"/>
-          </a:effectRef>
-          <a:fontRef idx="minor">
-            <a:schemeClr val="lt1"/>
-          </a:fontRef>
-        </p:style>
-        <p:txBody>
-          <a:bodyPr rtlCol="0" anchor="ctr"/>
-          <a:lstStyle/>
-          <a:p>
-            <a:pPr algn="ctr"/>
-            <a:endParaRPr kumimoji="1" lang="ja-JP" altLang="en-US"/>
-          </a:p>
-        </p:txBody>
-      </p:sp>
-      <p:sp>
-        <p:nvSpPr>
-          <p:cNvPr id="1044" name="テキスト ボックス 1043">
-            <a:extLst>
-              <a:ext uri="{FF2B5EF4-FFF2-40B4-BE49-F238E27FC236}">
-                <a16:creationId xmlns:a16="http://schemas.microsoft.com/office/drawing/2014/main" id="{498B4D2D-9EA8-6FC2-CA89-D9119D5464B0}"/>
-              </a:ext>
-            </a:extLst>
-          </p:cNvPr>
-          <p:cNvSpPr txBox="1"/>
-          <p:nvPr/>
-        </p:nvSpPr>
-        <p:spPr>
-          <a:xfrm>
-            <a:off x="10657357" y="3877727"/>
-            <a:ext cx="1223360" cy="461665"/>
-          </a:xfrm>
-          <a:prstGeom prst="rect">
-            <a:avLst/>
-          </a:prstGeom>
-          <a:noFill/>
-        </p:spPr>
-        <p:txBody>
-          <a:bodyPr wrap="square" rtlCol="0">
-            <a:spAutoFit/>
-          </a:bodyPr>
-          <a:lstStyle/>
-          <a:p>
-            <a:pPr algn="l"/>
-            <a:r>
-              <a:rPr kumimoji="1" lang="ja-JP" altLang="en-US" sz="1200" dirty="0">
-                <a:latin typeface="Yu Gothic UI Semibold" panose="020B0700000000000000" pitchFamily="50" charset="-128"/>
-                <a:ea typeface="Yu Gothic UI Semibold" panose="020B0700000000000000" pitchFamily="50" charset="-128"/>
-              </a:rPr>
-              <a:t>情報をテキストとして抽出</a:t>
-            </a:r>
-          </a:p>
-        </p:txBody>
-      </p:sp>
-      <p:pic>
-        <p:nvPicPr>
-          <p:cNvPr id="1054" name="Picture 2" descr="App Service の料金 | Microsoft Azure">
-            <a:extLst>
-              <a:ext uri="{FF2B5EF4-FFF2-40B4-BE49-F238E27FC236}">
-                <a16:creationId xmlns:a16="http://schemas.microsoft.com/office/drawing/2014/main" id="{DFBA8350-6F85-2178-6AFA-1C01B8886C0A}"/>
-              </a:ext>
-            </a:extLst>
-          </p:cNvPr>
-          <p:cNvPicPr>
-            <a:picLocks noChangeAspect="1" noChangeArrowheads="1"/>
-          </p:cNvPicPr>
-          <p:nvPr/>
-        </p:nvPicPr>
-        <p:blipFill>
-          <a:blip r:embed="rId17">
-            <a:extLst>
-              <a:ext uri="{28A0092B-C50C-407E-A947-70E740481C1C}">
-                <a14:useLocalDpi xmlns:a14="http://schemas.microsoft.com/office/drawing/2010/main" val="0"/>
-              </a:ext>
-            </a:extLst>
-          </a:blip>
-          <a:srcRect/>
-          <a:stretch>
-            <a:fillRect/>
-          </a:stretch>
-        </p:blipFill>
-        <p:spPr bwMode="auto">
-          <a:xfrm>
-            <a:off x="4124528" y="742038"/>
-            <a:ext cx="866573" cy="454951"/>
-          </a:xfrm>
-          <a:prstGeom prst="rect">
-            <a:avLst/>
-          </a:prstGeom>
-          <a:noFill/>
-          <a:extLst>
-            <a:ext uri="{909E8E84-426E-40DD-AFC4-6F175D3DCCD1}">
-              <a14:hiddenFill xmlns:a14="http://schemas.microsoft.com/office/drawing/2010/main">
-                <a:solidFill>
-                  <a:srgbClr val="FFFFFF"/>
-                </a:solidFill>
-              </a14:hiddenFill>
-            </a:ext>
-          </a:extLst>
-        </p:spPr>
-      </p:pic>
-      <p:pic>
-        <p:nvPicPr>
-          <p:cNvPr id="3" name="図 2">
-            <a:extLst>
-              <a:ext uri="{FF2B5EF4-FFF2-40B4-BE49-F238E27FC236}">
-                <a16:creationId xmlns:a16="http://schemas.microsoft.com/office/drawing/2014/main" id="{1CC7E4BF-506E-AD05-FECB-18677195423C}"/>
-              </a:ext>
-            </a:extLst>
-          </p:cNvPr>
-          <p:cNvPicPr>
-            <a:picLocks noChangeAspect="1"/>
-          </p:cNvPicPr>
-          <p:nvPr/>
-        </p:nvPicPr>
-        <p:blipFill rotWithShape="1">
-          <a:blip r:embed="rId18"/>
-          <a:srcRect l="2691" t="34959" r="62187" b="39512"/>
-          <a:stretch/>
-        </p:blipFill>
-        <p:spPr>
-          <a:xfrm>
-            <a:off x="1795346" y="3992137"/>
-            <a:ext cx="3813717" cy="1750742"/>
-          </a:xfrm>
-          <a:prstGeom prst="rect">
-            <a:avLst/>
-          </a:prstGeom>
         </p:spPr>
       </p:pic>
     </p:spTree>

</xml_diff>